<commit_message>
Documento Tesis 2 v3
</commit_message>
<xml_diff>
--- a/Documentación/Presentaciones PPT/Tesis 1 - Mendez Sustentación v1.pptx
+++ b/Documentación/Presentaciones PPT/Tesis 1 - Mendez Sustentación v1.pptx
@@ -5919,22 +5919,22 @@
     </dgm:pt>
   </dgm:ptLst>
   <dgm:cxnLst>
-    <dgm:cxn modelId="{D296B1B1-6E07-427D-8A10-C347D641794D}" type="presOf" srcId="{3BFDB7AE-EA70-4208-99E4-6652F73E09AF}" destId="{501DDC76-9B9F-4697-8027-10EB121BC8A9}" srcOrd="1" destOrd="0" presId="urn:microsoft.com/office/officeart/2005/8/layout/list1"/>
+    <dgm:cxn modelId="{2574EEDE-B8E7-488A-A48F-D17B50AF3787}" type="presOf" srcId="{A43E1EE4-EA84-469B-B8E9-F87184BCD406}" destId="{FC04ED5C-48CE-49A3-98DF-4CA3B004B014}" srcOrd="0" destOrd="0" presId="urn:microsoft.com/office/officeart/2005/8/layout/list1"/>
+    <dgm:cxn modelId="{198A57FC-4B66-4936-82CE-13D8CA1AD1C0}" type="presOf" srcId="{4D5D3E7B-9F50-4387-AFBC-12316FB9B2E8}" destId="{F126904A-86E7-4DEB-A715-98702053D074}" srcOrd="0" destOrd="0" presId="urn:microsoft.com/office/officeart/2005/8/layout/list1"/>
+    <dgm:cxn modelId="{5BEF8FBD-F7BC-444D-94D8-BB8E5A82AA43}" srcId="{9BF01063-3BAB-4F4D-ADE8-387A89D22F7C}" destId="{924689B8-E4E2-4802-BC6B-5B17E3AC8DDF}" srcOrd="2" destOrd="0" parTransId="{670CB166-EC54-4ECF-99EE-166A3C70F39E}" sibTransId="{A9E69FD6-91A0-40D3-96F5-93981AACB6C2}"/>
+    <dgm:cxn modelId="{A6AB94D5-D54E-40B0-B130-8EB5F0CB88C7}" type="presOf" srcId="{9BF01063-3BAB-4F4D-ADE8-387A89D22F7C}" destId="{159D9149-F9AA-45E8-ABA6-7AC56A21C1F8}" srcOrd="0" destOrd="0" presId="urn:microsoft.com/office/officeart/2005/8/layout/list1"/>
+    <dgm:cxn modelId="{49F81D02-D70A-4F2B-9CE4-5B35C4DBEA48}" type="presOf" srcId="{3BFDB7AE-EA70-4208-99E4-6652F73E09AF}" destId="{0F91977E-FD5F-4F09-AD28-B3380115D8C3}" srcOrd="0" destOrd="0" presId="urn:microsoft.com/office/officeart/2005/8/layout/list1"/>
+    <dgm:cxn modelId="{E91F903A-7BDD-4C9D-93F9-6B089175ECBB}" type="presOf" srcId="{4D5D3E7B-9F50-4387-AFBC-12316FB9B2E8}" destId="{15417C44-1630-41CC-AC5B-95723803EAAC}" srcOrd="1" destOrd="0" presId="urn:microsoft.com/office/officeart/2005/8/layout/list1"/>
+    <dgm:cxn modelId="{FB20BC1E-834C-48C0-BD4E-04A5E0873844}" srcId="{4D5D3E7B-9F50-4387-AFBC-12316FB9B2E8}" destId="{4C11F0D3-B1D8-41E5-B4ED-D28D5406ED7A}" srcOrd="0" destOrd="0" parTransId="{C60CEBD2-531F-45D5-9CB2-1FBB715F4879}" sibTransId="{A1BF3405-CB09-4D5F-AAD9-E76A127FDC0C}"/>
     <dgm:cxn modelId="{99B28ECE-6E7A-4BBB-A9F6-6E21AD3DECEA}" type="presOf" srcId="{5D56325C-A28C-4982-810F-F3CCECEC2E7D}" destId="{3C682040-43AF-4BE8-950E-E13003E6C6C7}" srcOrd="0" destOrd="0" presId="urn:microsoft.com/office/officeart/2005/8/layout/list1"/>
     <dgm:cxn modelId="{E344A32A-539A-4B7E-ACFA-95DEF5620BA5}" srcId="{9BF01063-3BAB-4F4D-ADE8-387A89D22F7C}" destId="{3BFDB7AE-EA70-4208-99E4-6652F73E09AF}" srcOrd="1" destOrd="0" parTransId="{54A7580C-2761-4683-A631-30A94395D65A}" sibTransId="{9EFD2A57-70D2-4814-9534-F69C1AAF4BEC}"/>
-    <dgm:cxn modelId="{A6AB94D5-D54E-40B0-B130-8EB5F0CB88C7}" type="presOf" srcId="{9BF01063-3BAB-4F4D-ADE8-387A89D22F7C}" destId="{159D9149-F9AA-45E8-ABA6-7AC56A21C1F8}" srcOrd="0" destOrd="0" presId="urn:microsoft.com/office/officeart/2005/8/layout/list1"/>
-    <dgm:cxn modelId="{198A57FC-4B66-4936-82CE-13D8CA1AD1C0}" type="presOf" srcId="{4D5D3E7B-9F50-4387-AFBC-12316FB9B2E8}" destId="{F126904A-86E7-4DEB-A715-98702053D074}" srcOrd="0" destOrd="0" presId="urn:microsoft.com/office/officeart/2005/8/layout/list1"/>
-    <dgm:cxn modelId="{49F81D02-D70A-4F2B-9CE4-5B35C4DBEA48}" type="presOf" srcId="{3BFDB7AE-EA70-4208-99E4-6652F73E09AF}" destId="{0F91977E-FD5F-4F09-AD28-B3380115D8C3}" srcOrd="0" destOrd="0" presId="urn:microsoft.com/office/officeart/2005/8/layout/list1"/>
-    <dgm:cxn modelId="{FB20BC1E-834C-48C0-BD4E-04A5E0873844}" srcId="{4D5D3E7B-9F50-4387-AFBC-12316FB9B2E8}" destId="{4C11F0D3-B1D8-41E5-B4ED-D28D5406ED7A}" srcOrd="0" destOrd="0" parTransId="{C60CEBD2-531F-45D5-9CB2-1FBB715F4879}" sibTransId="{A1BF3405-CB09-4D5F-AAD9-E76A127FDC0C}"/>
+    <dgm:cxn modelId="{13784A0F-C37B-4B4E-82C1-6C2D3670DCD1}" type="presOf" srcId="{924689B8-E4E2-4802-BC6B-5B17E3AC8DDF}" destId="{E74DBF66-3AE1-4F14-A029-A5F2D0C36F78}" srcOrd="1" destOrd="0" presId="urn:microsoft.com/office/officeart/2005/8/layout/list1"/>
+    <dgm:cxn modelId="{762A48AD-0F80-42F1-A14C-B47917FB05F0}" type="presOf" srcId="{924689B8-E4E2-4802-BC6B-5B17E3AC8DDF}" destId="{E2ADE456-C079-4778-88D3-2ABF030BE345}" srcOrd="0" destOrd="0" presId="urn:microsoft.com/office/officeart/2005/8/layout/list1"/>
+    <dgm:cxn modelId="{DED07964-2F3D-434B-8896-63F590AFB3D4}" srcId="{9BF01063-3BAB-4F4D-ADE8-387A89D22F7C}" destId="{4D5D3E7B-9F50-4387-AFBC-12316FB9B2E8}" srcOrd="0" destOrd="0" parTransId="{4B140464-D0A6-4FE6-BFF1-D92A0DD7F2F3}" sibTransId="{86595B4C-0A5C-4BD5-A6B3-FDB543D91B73}"/>
+    <dgm:cxn modelId="{D296B1B1-6E07-427D-8A10-C347D641794D}" type="presOf" srcId="{3BFDB7AE-EA70-4208-99E4-6652F73E09AF}" destId="{501DDC76-9B9F-4697-8027-10EB121BC8A9}" srcOrd="1" destOrd="0" presId="urn:microsoft.com/office/officeart/2005/8/layout/list1"/>
+    <dgm:cxn modelId="{5B2A33DE-E772-4FBA-B0D4-8CAF0D2FB68C}" type="presOf" srcId="{4C11F0D3-B1D8-41E5-B4ED-D28D5406ED7A}" destId="{C94856A0-C8B1-4244-B645-C266926A0AAB}" srcOrd="0" destOrd="0" presId="urn:microsoft.com/office/officeart/2005/8/layout/list1"/>
+    <dgm:cxn modelId="{2206174B-0967-4701-B7BB-572D079B3A22}" srcId="{3BFDB7AE-EA70-4208-99E4-6652F73E09AF}" destId="{5D56325C-A28C-4982-810F-F3CCECEC2E7D}" srcOrd="0" destOrd="0" parTransId="{5D99972C-BEA3-4759-BAAC-F0514ABC1FE1}" sibTransId="{ECCC7701-505F-42F0-B3C4-E9890A7BB77B}"/>
     <dgm:cxn modelId="{C611089B-F9C4-4CB8-A2DC-4A6E2B8ECF02}" srcId="{924689B8-E4E2-4802-BC6B-5B17E3AC8DDF}" destId="{A43E1EE4-EA84-469B-B8E9-F87184BCD406}" srcOrd="0" destOrd="0" parTransId="{B5EEE765-35D4-4DF0-BFEC-78B63BE24D65}" sibTransId="{DFDEAEA3-03A5-44E8-ACA1-35C31669F285}"/>
-    <dgm:cxn modelId="{DED07964-2F3D-434B-8896-63F590AFB3D4}" srcId="{9BF01063-3BAB-4F4D-ADE8-387A89D22F7C}" destId="{4D5D3E7B-9F50-4387-AFBC-12316FB9B2E8}" srcOrd="0" destOrd="0" parTransId="{4B140464-D0A6-4FE6-BFF1-D92A0DD7F2F3}" sibTransId="{86595B4C-0A5C-4BD5-A6B3-FDB543D91B73}"/>
-    <dgm:cxn modelId="{762A48AD-0F80-42F1-A14C-B47917FB05F0}" type="presOf" srcId="{924689B8-E4E2-4802-BC6B-5B17E3AC8DDF}" destId="{E2ADE456-C079-4778-88D3-2ABF030BE345}" srcOrd="0" destOrd="0" presId="urn:microsoft.com/office/officeart/2005/8/layout/list1"/>
-    <dgm:cxn modelId="{2574EEDE-B8E7-488A-A48F-D17B50AF3787}" type="presOf" srcId="{A43E1EE4-EA84-469B-B8E9-F87184BCD406}" destId="{FC04ED5C-48CE-49A3-98DF-4CA3B004B014}" srcOrd="0" destOrd="0" presId="urn:microsoft.com/office/officeart/2005/8/layout/list1"/>
-    <dgm:cxn modelId="{E91F903A-7BDD-4C9D-93F9-6B089175ECBB}" type="presOf" srcId="{4D5D3E7B-9F50-4387-AFBC-12316FB9B2E8}" destId="{15417C44-1630-41CC-AC5B-95723803EAAC}" srcOrd="1" destOrd="0" presId="urn:microsoft.com/office/officeart/2005/8/layout/list1"/>
-    <dgm:cxn modelId="{5BEF8FBD-F7BC-444D-94D8-BB8E5A82AA43}" srcId="{9BF01063-3BAB-4F4D-ADE8-387A89D22F7C}" destId="{924689B8-E4E2-4802-BC6B-5B17E3AC8DDF}" srcOrd="2" destOrd="0" parTransId="{670CB166-EC54-4ECF-99EE-166A3C70F39E}" sibTransId="{A9E69FD6-91A0-40D3-96F5-93981AACB6C2}"/>
-    <dgm:cxn modelId="{2206174B-0967-4701-B7BB-572D079B3A22}" srcId="{3BFDB7AE-EA70-4208-99E4-6652F73E09AF}" destId="{5D56325C-A28C-4982-810F-F3CCECEC2E7D}" srcOrd="0" destOrd="0" parTransId="{5D99972C-BEA3-4759-BAAC-F0514ABC1FE1}" sibTransId="{ECCC7701-505F-42F0-B3C4-E9890A7BB77B}"/>
-    <dgm:cxn modelId="{5B2A33DE-E772-4FBA-B0D4-8CAF0D2FB68C}" type="presOf" srcId="{4C11F0D3-B1D8-41E5-B4ED-D28D5406ED7A}" destId="{C94856A0-C8B1-4244-B645-C266926A0AAB}" srcOrd="0" destOrd="0" presId="urn:microsoft.com/office/officeart/2005/8/layout/list1"/>
-    <dgm:cxn modelId="{13784A0F-C37B-4B4E-82C1-6C2D3670DCD1}" type="presOf" srcId="{924689B8-E4E2-4802-BC6B-5B17E3AC8DDF}" destId="{E74DBF66-3AE1-4F14-A029-A5F2D0C36F78}" srcOrd="1" destOrd="0" presId="urn:microsoft.com/office/officeart/2005/8/layout/list1"/>
     <dgm:cxn modelId="{D84620DE-EC6C-4370-896E-3276F32C339B}" type="presParOf" srcId="{159D9149-F9AA-45E8-ABA6-7AC56A21C1F8}" destId="{1063D51E-A931-450E-B6C9-26E16E6105C8}" srcOrd="0" destOrd="0" presId="urn:microsoft.com/office/officeart/2005/8/layout/list1"/>
     <dgm:cxn modelId="{75875F38-07B8-4B7D-9B4F-61915F5603DE}" type="presParOf" srcId="{1063D51E-A931-450E-B6C9-26E16E6105C8}" destId="{F126904A-86E7-4DEB-A715-98702053D074}" srcOrd="0" destOrd="0" presId="urn:microsoft.com/office/officeart/2005/8/layout/list1"/>
     <dgm:cxn modelId="{3E21A71D-4A72-490F-81E0-1C65265E28DE}" type="presParOf" srcId="{1063D51E-A931-450E-B6C9-26E16E6105C8}" destId="{15417C44-1630-41CC-AC5B-95723803EAAC}" srcOrd="1" destOrd="0" presId="urn:microsoft.com/office/officeart/2005/8/layout/list1"/>
@@ -6686,8 +6686,8 @@
     <dgm:cxn modelId="{C9A8FD20-E1F2-4DA7-9D73-36A39338A961}" type="presOf" srcId="{B23FF221-BCE0-45A2-A8E7-C5839946C20A}" destId="{05F5B675-A481-4090-9BE1-378A47821575}" srcOrd="0" destOrd="0" presId="urn:microsoft.com/office/officeart/2005/8/layout/vList5"/>
     <dgm:cxn modelId="{3C216458-3CE0-4BC8-A425-4799717D5F2A}" srcId="{E84173FC-3A9A-411E-9CA6-0C4FBEF0171C}" destId="{74B08D14-3D69-4315-8054-C69D98914B47}" srcOrd="0" destOrd="0" parTransId="{31EE225E-AC08-4635-967C-3D10396DA8BE}" sibTransId="{DCF518B5-FB68-4F3A-9320-7CDB78127BF4}"/>
     <dgm:cxn modelId="{B30EA60E-B450-45A3-A4D3-997912F8A53F}" srcId="{435DC60F-67DF-4C3F-8884-A3E18B4F7F92}" destId="{5954327B-41CB-4731-928E-E09CA110C67C}" srcOrd="0" destOrd="0" parTransId="{D3A1AC1A-109A-4E54-A90D-A76D0DE4D84C}" sibTransId="{9FA31C40-84D2-4AE5-AF1C-C3F38C2CFB22}"/>
+    <dgm:cxn modelId="{3AFA3530-CDB9-4790-BB8B-5A72E575B43D}" type="presOf" srcId="{48489976-AF02-4119-82BE-0CA3AC45BC30}" destId="{FB62193B-2F1D-4A91-B26C-671F94C83B03}" srcOrd="0" destOrd="0" presId="urn:microsoft.com/office/officeart/2005/8/layout/vList5"/>
     <dgm:cxn modelId="{7C4062C0-DD79-4957-B905-D0096D41A76B}" type="presOf" srcId="{435DC60F-67DF-4C3F-8884-A3E18B4F7F92}" destId="{A075BA52-9E9E-49BC-B10D-54726DBFECBB}" srcOrd="0" destOrd="0" presId="urn:microsoft.com/office/officeart/2005/8/layout/vList5"/>
-    <dgm:cxn modelId="{3AFA3530-CDB9-4790-BB8B-5A72E575B43D}" type="presOf" srcId="{48489976-AF02-4119-82BE-0CA3AC45BC30}" destId="{FB62193B-2F1D-4A91-B26C-671F94C83B03}" srcOrd="0" destOrd="0" presId="urn:microsoft.com/office/officeart/2005/8/layout/vList5"/>
     <dgm:cxn modelId="{44C3E60E-6F47-4102-A45D-F52BE23D11DA}" type="presOf" srcId="{0E4CBE44-A463-4F0C-A47D-5164B794EAEA}" destId="{8A58B697-73FE-43B7-BCEA-3226F7839FCE}" srcOrd="0" destOrd="0" presId="urn:microsoft.com/office/officeart/2005/8/layout/vList5"/>
     <dgm:cxn modelId="{B14A061E-C16C-45CC-AA1E-C58718C9D87D}" srcId="{D1BC2852-F435-43FD-9978-51C6F465810C}" destId="{BB7FC414-5851-4AE2-B36B-DDDACD64A9D9}" srcOrd="2" destOrd="0" parTransId="{2EAAC6FF-62FD-4BD2-89CF-43C3F1CBB8E7}" sibTransId="{97553316-DDF8-440A-B5C9-94195FA7519B}"/>
     <dgm:cxn modelId="{EE967C7F-F20E-4C94-9CBA-1598056CA94D}" srcId="{D1BC2852-F435-43FD-9978-51C6F465810C}" destId="{E84173FC-3A9A-411E-9CA6-0C4FBEF0171C}" srcOrd="0" destOrd="0" parTransId="{FB354760-7635-4556-9247-B61E778E32E4}" sibTransId="{8967AF39-84C1-4182-AD6B-9A2A62782D66}"/>
@@ -22430,11 +22430,7 @@
             </a:r>
             <a:r>
               <a:rPr lang="es-PE" sz="2000" dirty="0" smtClean="0"/>
-              <a:t>algunos de </a:t>
-            </a:r>
-            <a:r>
-              <a:rPr lang="es-PE" sz="2000" dirty="0" smtClean="0"/>
-              <a:t>los siguientes </a:t>
+              <a:t>algunos de los siguientes </a:t>
             </a:r>
             <a:r>
               <a:rPr lang="es-PE" sz="2000" i="1" dirty="0" smtClean="0"/>
@@ -22446,15 +22442,7 @@
             </a:r>
             <a:r>
               <a:rPr lang="es-MX" sz="2000" dirty="0" smtClean="0"/>
-              <a:t>carpintería, drywall, electricidad, gasfitería, jardinería, melamina, </a:t>
-            </a:r>
-            <a:r>
-              <a:rPr lang="es-MX" sz="2000" dirty="0" smtClean="0"/>
-              <a:t>pintura y </a:t>
-            </a:r>
-            <a:r>
-              <a:rPr lang="es-MX" sz="2000" dirty="0" smtClean="0"/>
-              <a:t>vidriería. Otros servicios no se consideran.</a:t>
+              <a:t>carpintería, drywall, electricidad, gasfitería, jardinería, melamina, pintura y vidriería. Otros servicios no se consideran.</a:t>
             </a:r>
           </a:p>
           <a:p>
@@ -26283,15 +26271,7 @@
             </a:pPr>
             <a:r>
               <a:rPr lang="es-PE" dirty="0" smtClean="0"/>
-              <a:t>Problema central es la falta de </a:t>
-            </a:r>
-            <a:r>
-              <a:rPr lang="es-PE" dirty="0" smtClean="0"/>
-              <a:t>un mecanismo que </a:t>
-            </a:r>
-            <a:r>
-              <a:rPr lang="es-PE" dirty="0" smtClean="0"/>
-              <a:t>permita:</a:t>
+              <a:t>Problema central es la falta de un mecanismo que permita:</a:t>
             </a:r>
           </a:p>
           <a:p>

</xml_diff>